<commit_message>
delete of file in src directory
</commit_message>
<xml_diff>
--- a/Show.pptx
+++ b/Show.pptx
@@ -12,6 +12,12 @@
     <p:sldId id="260" r:id="rId6"/>
     <p:sldId id="261" r:id="rId7"/>
     <p:sldId id="262" r:id="rId8"/>
+    <p:sldId id="263" r:id="rId9"/>
+    <p:sldId id="264" r:id="rId10"/>
+    <p:sldId id="265" r:id="rId11"/>
+    <p:sldId id="266" r:id="rId12"/>
+    <p:sldId id="267" r:id="rId13"/>
+    <p:sldId id="268" r:id="rId14"/>
   </p:sldIdLst>
   <p:sldSz cx="12192000" cy="6858000"/>
   <p:notesSz cx="6858000" cy="9144000"/>
@@ -6118,6 +6124,753 @@
 </p:sld>
 </file>
 
+<file path=ppt/slides/slide10.xml><?xml version="1.0" encoding="utf-8"?>
+<p:sld xmlns:a="http://schemas.openxmlformats.org/drawingml/2006/main" xmlns:r="http://schemas.openxmlformats.org/officeDocument/2006/relationships" xmlns:p="http://schemas.openxmlformats.org/presentationml/2006/main">
+  <p:cSld>
+    <p:spTree>
+      <p:nvGrpSpPr>
+        <p:cNvPr id="1" name=""/>
+        <p:cNvGrpSpPr/>
+        <p:nvPr/>
+      </p:nvGrpSpPr>
+      <p:grpSpPr>
+        <a:xfrm>
+          <a:off x="0" y="0"/>
+          <a:ext cx="0" cy="0"/>
+          <a:chOff x="0" y="0"/>
+          <a:chExt cx="0" cy="0"/>
+        </a:xfrm>
+      </p:grpSpPr>
+      <p:sp>
+        <p:nvSpPr>
+          <p:cNvPr id="2" name="Title 1">
+            <a:extLst>
+              <a:ext uri="{FF2B5EF4-FFF2-40B4-BE49-F238E27FC236}">
+                <a16:creationId xmlns:a16="http://schemas.microsoft.com/office/drawing/2014/main" id="{C4F69968-EC52-4A41-88D8-2FEAC30DAF81}"/>
+              </a:ext>
+            </a:extLst>
+          </p:cNvPr>
+          <p:cNvSpPr>
+            <a:spLocks noGrp="1"/>
+          </p:cNvSpPr>
+          <p:nvPr>
+            <p:ph type="title"/>
+          </p:nvPr>
+        </p:nvSpPr>
+        <p:spPr/>
+        <p:txBody>
+          <a:bodyPr/>
+          <a:lstStyle/>
+          <a:p>
+            <a:r>
+              <a:rPr lang="en-GB" dirty="0"/>
+              <a:t>Git : GitHub</a:t>
+            </a:r>
+          </a:p>
+        </p:txBody>
+      </p:sp>
+      <p:sp>
+        <p:nvSpPr>
+          <p:cNvPr id="3" name="Content Placeholder 2">
+            <a:extLst>
+              <a:ext uri="{FF2B5EF4-FFF2-40B4-BE49-F238E27FC236}">
+                <a16:creationId xmlns:a16="http://schemas.microsoft.com/office/drawing/2014/main" id="{A9C0E44A-50D8-43E1-9809-4C7B991870E4}"/>
+              </a:ext>
+            </a:extLst>
+          </p:cNvPr>
+          <p:cNvSpPr>
+            <a:spLocks noGrp="1"/>
+          </p:cNvSpPr>
+          <p:nvPr>
+            <p:ph idx="1"/>
+          </p:nvPr>
+        </p:nvSpPr>
+        <p:spPr/>
+        <p:txBody>
+          <a:bodyPr/>
+          <a:lstStyle/>
+          <a:p>
+            <a:endParaRPr lang="en-GB" dirty="0"/>
+          </a:p>
+        </p:txBody>
+      </p:sp>
+    </p:spTree>
+    <p:extLst>
+      <p:ext uri="{BB962C8B-B14F-4D97-AF65-F5344CB8AC3E}">
+        <p14:creationId xmlns:p14="http://schemas.microsoft.com/office/powerpoint/2010/main" val="2643681163"/>
+      </p:ext>
+    </p:extLst>
+  </p:cSld>
+  <p:clrMapOvr>
+    <a:masterClrMapping/>
+  </p:clrMapOvr>
+</p:sld>
+</file>
+
+<file path=ppt/slides/slide11.xml><?xml version="1.0" encoding="utf-8"?>
+<p:sld xmlns:a="http://schemas.openxmlformats.org/drawingml/2006/main" xmlns:r="http://schemas.openxmlformats.org/officeDocument/2006/relationships" xmlns:p="http://schemas.openxmlformats.org/presentationml/2006/main">
+  <p:cSld>
+    <p:spTree>
+      <p:nvGrpSpPr>
+        <p:cNvPr id="1" name=""/>
+        <p:cNvGrpSpPr/>
+        <p:nvPr/>
+      </p:nvGrpSpPr>
+      <p:grpSpPr>
+        <a:xfrm>
+          <a:off x="0" y="0"/>
+          <a:ext cx="0" cy="0"/>
+          <a:chOff x="0" y="0"/>
+          <a:chExt cx="0" cy="0"/>
+        </a:xfrm>
+      </p:grpSpPr>
+      <p:sp>
+        <p:nvSpPr>
+          <p:cNvPr id="2" name="Title 1">
+            <a:extLst>
+              <a:ext uri="{FF2B5EF4-FFF2-40B4-BE49-F238E27FC236}">
+                <a16:creationId xmlns:a16="http://schemas.microsoft.com/office/drawing/2014/main" id="{C4F69968-EC52-4A41-88D8-2FEAC30DAF81}"/>
+              </a:ext>
+            </a:extLst>
+          </p:cNvPr>
+          <p:cNvSpPr>
+            <a:spLocks noGrp="1"/>
+          </p:cNvSpPr>
+          <p:nvPr>
+            <p:ph type="title"/>
+          </p:nvPr>
+        </p:nvSpPr>
+        <p:spPr/>
+        <p:txBody>
+          <a:bodyPr/>
+          <a:lstStyle/>
+          <a:p>
+            <a:r>
+              <a:rPr lang="en-GB" dirty="0" err="1"/>
+              <a:t>Bilan</a:t>
+            </a:r>
+            <a:r>
+              <a:rPr lang="en-GB" dirty="0"/>
+              <a:t> </a:t>
+            </a:r>
+            <a:r>
+              <a:rPr lang="en-GB" dirty="0" err="1"/>
+              <a:t>Collectif</a:t>
+            </a:r>
+            <a:r>
+              <a:rPr lang="en-GB" dirty="0"/>
+              <a:t> </a:t>
+            </a:r>
+          </a:p>
+        </p:txBody>
+      </p:sp>
+      <p:sp>
+        <p:nvSpPr>
+          <p:cNvPr id="3" name="Content Placeholder 2">
+            <a:extLst>
+              <a:ext uri="{FF2B5EF4-FFF2-40B4-BE49-F238E27FC236}">
+                <a16:creationId xmlns:a16="http://schemas.microsoft.com/office/drawing/2014/main" id="{A9C0E44A-50D8-43E1-9809-4C7B991870E4}"/>
+              </a:ext>
+            </a:extLst>
+          </p:cNvPr>
+          <p:cNvSpPr>
+            <a:spLocks noGrp="1"/>
+          </p:cNvSpPr>
+          <p:nvPr>
+            <p:ph idx="1"/>
+          </p:nvPr>
+        </p:nvSpPr>
+        <p:spPr/>
+        <p:txBody>
+          <a:bodyPr/>
+          <a:lstStyle/>
+          <a:p>
+            <a:r>
+              <a:rPr lang="en-GB" dirty="0"/>
+              <a:t>Plus </a:t>
+            </a:r>
+            <a:r>
+              <a:rPr lang="en-GB" dirty="0" err="1"/>
+              <a:t>sécurisé</a:t>
+            </a:r>
+            <a:r>
+              <a:rPr lang="en-GB" dirty="0"/>
+              <a:t> que Twitter</a:t>
+            </a:r>
+          </a:p>
+        </p:txBody>
+      </p:sp>
+    </p:spTree>
+    <p:extLst>
+      <p:ext uri="{BB962C8B-B14F-4D97-AF65-F5344CB8AC3E}">
+        <p14:creationId xmlns:p14="http://schemas.microsoft.com/office/powerpoint/2010/main" val="1178328485"/>
+      </p:ext>
+    </p:extLst>
+  </p:cSld>
+  <p:clrMapOvr>
+    <a:masterClrMapping/>
+  </p:clrMapOvr>
+</p:sld>
+</file>
+
+<file path=ppt/slides/slide12.xml><?xml version="1.0" encoding="utf-8"?>
+<p:sld xmlns:a="http://schemas.openxmlformats.org/drawingml/2006/main" xmlns:r="http://schemas.openxmlformats.org/officeDocument/2006/relationships" xmlns:p="http://schemas.openxmlformats.org/presentationml/2006/main">
+  <p:cSld>
+    <p:spTree>
+      <p:nvGrpSpPr>
+        <p:cNvPr id="1" name=""/>
+        <p:cNvGrpSpPr/>
+        <p:nvPr/>
+      </p:nvGrpSpPr>
+      <p:grpSpPr>
+        <a:xfrm>
+          <a:off x="0" y="0"/>
+          <a:ext cx="0" cy="0"/>
+          <a:chOff x="0" y="0"/>
+          <a:chExt cx="0" cy="0"/>
+        </a:xfrm>
+      </p:grpSpPr>
+      <p:sp>
+        <p:nvSpPr>
+          <p:cNvPr id="2" name="Title 1">
+            <a:extLst>
+              <a:ext uri="{FF2B5EF4-FFF2-40B4-BE49-F238E27FC236}">
+                <a16:creationId xmlns:a16="http://schemas.microsoft.com/office/drawing/2014/main" id="{C4F69968-EC52-4A41-88D8-2FEAC30DAF81}"/>
+              </a:ext>
+            </a:extLst>
+          </p:cNvPr>
+          <p:cNvSpPr>
+            <a:spLocks noGrp="1"/>
+          </p:cNvSpPr>
+          <p:nvPr>
+            <p:ph type="title"/>
+          </p:nvPr>
+        </p:nvSpPr>
+        <p:spPr/>
+        <p:txBody>
+          <a:bodyPr/>
+          <a:lstStyle/>
+          <a:p>
+            <a:r>
+              <a:rPr lang="en-GB" dirty="0" err="1"/>
+              <a:t>Bilan</a:t>
+            </a:r>
+            <a:r>
+              <a:rPr lang="en-GB" dirty="0"/>
+              <a:t> </a:t>
+            </a:r>
+            <a:r>
+              <a:rPr lang="en-GB" dirty="0" err="1"/>
+              <a:t>Personnels</a:t>
+            </a:r>
+            <a:endParaRPr lang="en-GB" dirty="0"/>
+          </a:p>
+        </p:txBody>
+      </p:sp>
+      <p:graphicFrame>
+        <p:nvGraphicFramePr>
+          <p:cNvPr id="5" name="Content Placeholder 4">
+            <a:extLst>
+              <a:ext uri="{FF2B5EF4-FFF2-40B4-BE49-F238E27FC236}">
+                <a16:creationId xmlns:a16="http://schemas.microsoft.com/office/drawing/2014/main" id="{4A0296E7-9D52-4545-AFE3-AFEB4ADE390A}"/>
+              </a:ext>
+            </a:extLst>
+          </p:cNvPr>
+          <p:cNvGraphicFramePr>
+            <a:graphicFrameLocks noGrp="1"/>
+          </p:cNvGraphicFramePr>
+          <p:nvPr>
+            <p:ph idx="1"/>
+            <p:extLst>
+              <p:ext uri="{D42A27DB-BD31-4B8C-83A1-F6EECF244321}">
+                <p14:modId xmlns:p14="http://schemas.microsoft.com/office/powerpoint/2010/main" val="4017787776"/>
+              </p:ext>
+            </p:extLst>
+          </p:nvPr>
+        </p:nvGraphicFramePr>
+        <p:xfrm>
+          <a:off x="914400" y="1731963"/>
+          <a:ext cx="10353675" cy="3754120"/>
+        </p:xfrm>
+        <a:graphic>
+          <a:graphicData uri="http://schemas.openxmlformats.org/drawingml/2006/table">
+            <a:tbl>
+              <a:tblPr firstRow="1" bandRow="1">
+                <a:tableStyleId>{5C22544A-7EE6-4342-B048-85BDC9FD1C3A}</a:tableStyleId>
+              </a:tblPr>
+              <a:tblGrid>
+                <a:gridCol w="3451225">
+                  <a:extLst>
+                    <a:ext uri="{9D8B030D-6E8A-4147-A177-3AD203B41FA5}">
+                      <a16:colId xmlns:a16="http://schemas.microsoft.com/office/drawing/2014/main" val="268078978"/>
+                    </a:ext>
+                  </a:extLst>
+                </a:gridCol>
+                <a:gridCol w="3451225">
+                  <a:extLst>
+                    <a:ext uri="{9D8B030D-6E8A-4147-A177-3AD203B41FA5}">
+                      <a16:colId xmlns:a16="http://schemas.microsoft.com/office/drawing/2014/main" val="3449647389"/>
+                    </a:ext>
+                  </a:extLst>
+                </a:gridCol>
+                <a:gridCol w="3451225">
+                  <a:extLst>
+                    <a:ext uri="{9D8B030D-6E8A-4147-A177-3AD203B41FA5}">
+                      <a16:colId xmlns:a16="http://schemas.microsoft.com/office/drawing/2014/main" val="4166496835"/>
+                    </a:ext>
+                  </a:extLst>
+                </a:gridCol>
+              </a:tblGrid>
+              <a:tr h="370840">
+                <a:tc>
+                  <a:txBody>
+                    <a:bodyPr/>
+                    <a:lstStyle/>
+                    <a:p>
+                      <a:r>
+                        <a:rPr lang="en-GB" dirty="0">
+                          <a:solidFill>
+                            <a:schemeClr val="tx2"/>
+                          </a:solidFill>
+                        </a:rPr>
+                        <a:t>Romain </a:t>
+                      </a:r>
+                      <a:r>
+                        <a:rPr lang="en-GB" dirty="0" err="1">
+                          <a:solidFill>
+                            <a:schemeClr val="tx2"/>
+                          </a:solidFill>
+                        </a:rPr>
+                        <a:t>Brisse</a:t>
+                      </a:r>
+                      <a:endParaRPr lang="en-GB" dirty="0">
+                        <a:solidFill>
+                          <a:schemeClr val="tx2"/>
+                        </a:solidFill>
+                      </a:endParaRPr>
+                    </a:p>
+                  </a:txBody>
+                  <a:tcPr/>
+                </a:tc>
+                <a:tc>
+                  <a:txBody>
+                    <a:bodyPr/>
+                    <a:lstStyle/>
+                    <a:p>
+                      <a:r>
+                        <a:rPr lang="en-GB" dirty="0">
+                          <a:solidFill>
+                            <a:schemeClr val="tx2"/>
+                          </a:solidFill>
+                        </a:rPr>
+                        <a:t>Alexis Martin</a:t>
+                      </a:r>
+                    </a:p>
+                  </a:txBody>
+                  <a:tcPr/>
+                </a:tc>
+                <a:tc>
+                  <a:txBody>
+                    <a:bodyPr/>
+                    <a:lstStyle/>
+                    <a:p>
+                      <a:r>
+                        <a:rPr lang="en-GB" dirty="0">
+                          <a:solidFill>
+                            <a:schemeClr val="tx2"/>
+                          </a:solidFill>
+                        </a:rPr>
+                        <a:t>Gabriel Padis</a:t>
+                      </a:r>
+                    </a:p>
+                  </a:txBody>
+                  <a:tcPr/>
+                </a:tc>
+                <a:extLst>
+                  <a:ext uri="{0D108BD9-81ED-4DB2-BD59-A6C34878D82A}">
+                    <a16:rowId xmlns:a16="http://schemas.microsoft.com/office/drawing/2014/main" val="1539539260"/>
+                  </a:ext>
+                </a:extLst>
+              </a:tr>
+              <a:tr h="370840">
+                <a:tc>
+                  <a:txBody>
+                    <a:bodyPr/>
+                    <a:lstStyle/>
+                    <a:p>
+                      <a:endParaRPr lang="en-GB" dirty="0">
+                        <a:solidFill>
+                          <a:schemeClr val="tx2"/>
+                        </a:solidFill>
+                      </a:endParaRPr>
+                    </a:p>
+                    <a:p>
+                      <a:r>
+                        <a:rPr lang="en-GB" dirty="0">
+                          <a:solidFill>
+                            <a:schemeClr val="tx2"/>
+                          </a:solidFill>
+                        </a:rPr>
+                        <a:t>Responsable Design : </a:t>
+                      </a:r>
+                    </a:p>
+                    <a:p>
+                      <a:endParaRPr lang="en-GB" dirty="0">
+                        <a:solidFill>
+                          <a:schemeClr val="tx2"/>
+                        </a:solidFill>
+                      </a:endParaRPr>
+                    </a:p>
+                    <a:p>
+                      <a:endParaRPr lang="en-GB" dirty="0">
+                        <a:solidFill>
+                          <a:schemeClr val="tx2"/>
+                        </a:solidFill>
+                      </a:endParaRPr>
+                    </a:p>
+                    <a:p>
+                      <a:endParaRPr lang="en-GB" dirty="0">
+                        <a:solidFill>
+                          <a:schemeClr val="tx2"/>
+                        </a:solidFill>
+                      </a:endParaRPr>
+                    </a:p>
+                    <a:p>
+                      <a:endParaRPr lang="en-GB" dirty="0">
+                        <a:solidFill>
+                          <a:schemeClr val="tx2"/>
+                        </a:solidFill>
+                      </a:endParaRPr>
+                    </a:p>
+                    <a:p>
+                      <a:endParaRPr lang="en-GB" dirty="0">
+                        <a:solidFill>
+                          <a:schemeClr val="tx2"/>
+                        </a:solidFill>
+                      </a:endParaRPr>
+                    </a:p>
+                    <a:p>
+                      <a:endParaRPr lang="en-GB" dirty="0">
+                        <a:solidFill>
+                          <a:schemeClr val="tx2"/>
+                        </a:solidFill>
+                      </a:endParaRPr>
+                    </a:p>
+                    <a:p>
+                      <a:endParaRPr lang="en-GB" dirty="0">
+                        <a:solidFill>
+                          <a:schemeClr val="tx2"/>
+                        </a:solidFill>
+                      </a:endParaRPr>
+                    </a:p>
+                    <a:p>
+                      <a:endParaRPr lang="en-GB" dirty="0">
+                        <a:solidFill>
+                          <a:schemeClr val="tx2"/>
+                        </a:solidFill>
+                      </a:endParaRPr>
+                    </a:p>
+                    <a:p>
+                      <a:endParaRPr lang="en-GB" dirty="0">
+                        <a:solidFill>
+                          <a:schemeClr val="tx2"/>
+                        </a:solidFill>
+                      </a:endParaRPr>
+                    </a:p>
+                    <a:p>
+                      <a:endParaRPr lang="en-GB" dirty="0">
+                        <a:solidFill>
+                          <a:schemeClr val="tx2"/>
+                        </a:solidFill>
+                      </a:endParaRPr>
+                    </a:p>
+                  </a:txBody>
+                  <a:tcPr>
+                    <a:noFill/>
+                  </a:tcPr>
+                </a:tc>
+                <a:tc>
+                  <a:txBody>
+                    <a:bodyPr/>
+                    <a:lstStyle/>
+                    <a:p>
+                      <a:endParaRPr lang="en-GB" dirty="0">
+                        <a:solidFill>
+                          <a:schemeClr val="tx2"/>
+                        </a:solidFill>
+                      </a:endParaRPr>
+                    </a:p>
+                    <a:p>
+                      <a:r>
+                        <a:rPr lang="en-GB" dirty="0">
+                          <a:solidFill>
+                            <a:schemeClr val="tx2"/>
+                          </a:solidFill>
+                        </a:rPr>
+                        <a:t>Responsable User Information :</a:t>
+                      </a:r>
+                    </a:p>
+                    <a:p>
+                      <a:endParaRPr lang="en-GB" dirty="0">
+                        <a:solidFill>
+                          <a:schemeClr val="tx2"/>
+                        </a:solidFill>
+                      </a:endParaRPr>
+                    </a:p>
+                    <a:p>
+                      <a:r>
+                        <a:rPr lang="en-GB" dirty="0">
+                          <a:solidFill>
+                            <a:schemeClr val="tx2"/>
+                          </a:solidFill>
+                        </a:rPr>
+                        <a:t>	</a:t>
+                      </a:r>
+                    </a:p>
+                  </a:txBody>
+                  <a:tcPr>
+                    <a:noFill/>
+                  </a:tcPr>
+                </a:tc>
+                <a:tc>
+                  <a:txBody>
+                    <a:bodyPr/>
+                    <a:lstStyle/>
+                    <a:p>
+                      <a:endParaRPr lang="en-GB" dirty="0">
+                        <a:solidFill>
+                          <a:schemeClr val="tx2"/>
+                        </a:solidFill>
+                      </a:endParaRPr>
+                    </a:p>
+                    <a:p>
+                      <a:r>
+                        <a:rPr lang="en-GB" dirty="0">
+                          <a:solidFill>
+                            <a:schemeClr val="tx2"/>
+                          </a:solidFill>
+                        </a:rPr>
+                        <a:t>Responsable Base de Données :</a:t>
+                      </a:r>
+                    </a:p>
+                    <a:p>
+                      <a:r>
+                        <a:rPr lang="en-GB" dirty="0">
+                          <a:solidFill>
+                            <a:schemeClr val="tx2"/>
+                          </a:solidFill>
+                        </a:rPr>
+                        <a:t> </a:t>
+                      </a:r>
+                    </a:p>
+                  </a:txBody>
+                  <a:tcPr>
+                    <a:noFill/>
+                  </a:tcPr>
+                </a:tc>
+                <a:extLst>
+                  <a:ext uri="{0D108BD9-81ED-4DB2-BD59-A6C34878D82A}">
+                    <a16:rowId xmlns:a16="http://schemas.microsoft.com/office/drawing/2014/main" val="3274272258"/>
+                  </a:ext>
+                </a:extLst>
+              </a:tr>
+            </a:tbl>
+          </a:graphicData>
+        </a:graphic>
+      </p:graphicFrame>
+    </p:spTree>
+    <p:extLst>
+      <p:ext uri="{BB962C8B-B14F-4D97-AF65-F5344CB8AC3E}">
+        <p14:creationId xmlns:p14="http://schemas.microsoft.com/office/powerpoint/2010/main" val="1867575724"/>
+      </p:ext>
+    </p:extLst>
+  </p:cSld>
+  <p:clrMapOvr>
+    <a:masterClrMapping/>
+  </p:clrMapOvr>
+</p:sld>
+</file>
+
+<file path=ppt/slides/slide13.xml><?xml version="1.0" encoding="utf-8"?>
+<p:sld xmlns:a="http://schemas.openxmlformats.org/drawingml/2006/main" xmlns:r="http://schemas.openxmlformats.org/officeDocument/2006/relationships" xmlns:p="http://schemas.openxmlformats.org/presentationml/2006/main">
+  <p:cSld>
+    <p:spTree>
+      <p:nvGrpSpPr>
+        <p:cNvPr id="1" name=""/>
+        <p:cNvGrpSpPr/>
+        <p:nvPr/>
+      </p:nvGrpSpPr>
+      <p:grpSpPr>
+        <a:xfrm>
+          <a:off x="0" y="0"/>
+          <a:ext cx="0" cy="0"/>
+          <a:chOff x="0" y="0"/>
+          <a:chExt cx="0" cy="0"/>
+        </a:xfrm>
+      </p:grpSpPr>
+      <p:sp>
+        <p:nvSpPr>
+          <p:cNvPr id="2" name="Title 1">
+            <a:extLst>
+              <a:ext uri="{FF2B5EF4-FFF2-40B4-BE49-F238E27FC236}">
+                <a16:creationId xmlns:a16="http://schemas.microsoft.com/office/drawing/2014/main" id="{C4F69968-EC52-4A41-88D8-2FEAC30DAF81}"/>
+              </a:ext>
+            </a:extLst>
+          </p:cNvPr>
+          <p:cNvSpPr>
+            <a:spLocks noGrp="1"/>
+          </p:cNvSpPr>
+          <p:nvPr>
+            <p:ph type="title"/>
+          </p:nvPr>
+        </p:nvSpPr>
+        <p:spPr/>
+        <p:txBody>
+          <a:bodyPr/>
+          <a:lstStyle/>
+          <a:p>
+            <a:r>
+              <a:rPr lang="en-GB" dirty="0"/>
+              <a:t>Sources</a:t>
+            </a:r>
+          </a:p>
+        </p:txBody>
+      </p:sp>
+      <p:sp>
+        <p:nvSpPr>
+          <p:cNvPr id="3" name="Content Placeholder 2">
+            <a:extLst>
+              <a:ext uri="{FF2B5EF4-FFF2-40B4-BE49-F238E27FC236}">
+                <a16:creationId xmlns:a16="http://schemas.microsoft.com/office/drawing/2014/main" id="{A9C0E44A-50D8-43E1-9809-4C7B991870E4}"/>
+              </a:ext>
+            </a:extLst>
+          </p:cNvPr>
+          <p:cNvSpPr>
+            <a:spLocks noGrp="1"/>
+          </p:cNvSpPr>
+          <p:nvPr>
+            <p:ph idx="1"/>
+          </p:nvPr>
+        </p:nvSpPr>
+        <p:spPr/>
+        <p:txBody>
+          <a:bodyPr>
+            <a:noAutofit/>
+          </a:bodyPr>
+          <a:lstStyle/>
+          <a:p>
+            <a:r>
+              <a:rPr lang="en-GB" sz="1200" dirty="0"/>
+              <a:t>https://work.smarchal.com/twbscolor/css/e74c3cc0392becf0f1ffbbbc0</a:t>
+            </a:r>
+          </a:p>
+          <a:p>
+            <a:r>
+              <a:rPr lang="en-GB" sz="1200" dirty="0"/>
+              <a:t>https://openclassrooms.com/courses/prenez-en-main-bootstrap/elements-de-base</a:t>
+            </a:r>
+          </a:p>
+          <a:p>
+            <a:r>
+              <a:rPr lang="en-GB" sz="1200" dirty="0"/>
+              <a:t>https://stackoverflow.com/questions/18529274/change-navbar-color-in-twitter-bootstrap</a:t>
+            </a:r>
+          </a:p>
+          <a:p>
+            <a:r>
+              <a:rPr lang="en-GB" sz="1200" dirty="0"/>
+              <a:t>https://www.w3resource.com/php/function-reference/in_array.php</a:t>
+            </a:r>
+          </a:p>
+          <a:p>
+            <a:r>
+              <a:rPr lang="en-GB" sz="1200" dirty="0"/>
+              <a:t>https://secure.php.net/manual/en/function.array-merge.php</a:t>
+            </a:r>
+          </a:p>
+          <a:p>
+            <a:r>
+              <a:rPr lang="en-GB" sz="1200" dirty="0"/>
+              <a:t>https://secure.php.net/manual/en/function.strcmp.php</a:t>
+            </a:r>
+          </a:p>
+          <a:p>
+            <a:r>
+              <a:rPr lang="en-GB" sz="1200" dirty="0"/>
+              <a:t>https://secure.php.net/manual/en/function.unlink.php</a:t>
+            </a:r>
+          </a:p>
+          <a:p>
+            <a:r>
+              <a:rPr lang="en-GB" sz="1200" dirty="0"/>
+              <a:t>https://www.w3schools.com/jquery/jquery_selectors.asp</a:t>
+            </a:r>
+          </a:p>
+          <a:p>
+            <a:r>
+              <a:rPr lang="en-GB" sz="1200" dirty="0"/>
+              <a:t>https://stackoverflow.com/questions/5404839/how-can-i-refresh-a-page-with-jquery</a:t>
+            </a:r>
+          </a:p>
+          <a:p>
+            <a:r>
+              <a:rPr lang="en-GB" sz="1200" dirty="0"/>
+              <a:t>https://stackoverflow.com/questions/5470729/jquery-get-id-from-class-selector</a:t>
+            </a:r>
+          </a:p>
+          <a:p>
+            <a:r>
+              <a:rPr lang="en-GB" sz="1200" dirty="0"/>
+              <a:t>https://api.jquery.com/jquery.ajax/</a:t>
+            </a:r>
+          </a:p>
+          <a:p>
+            <a:r>
+              <a:rPr lang="en-GB" sz="1200" dirty="0"/>
+              <a:t>https://www.w3schools.com/jquery/jquery_ajax_get_post.asp</a:t>
+            </a:r>
+          </a:p>
+          <a:p>
+            <a:r>
+              <a:rPr lang="en-GB" sz="1200" dirty="0"/>
+              <a:t>https://stackoverflow.com/questions/15576548/how-to-pass-parameters-in-get-requests-with-jquery</a:t>
+            </a:r>
+          </a:p>
+          <a:p>
+            <a:r>
+              <a:rPr lang="en-GB" sz="1200" dirty="0"/>
+              <a:t>https://www.w3schools.com/jsref/met_loc_reload.asp</a:t>
+            </a:r>
+          </a:p>
+          <a:p>
+            <a:endParaRPr lang="en-GB" sz="1200" dirty="0"/>
+          </a:p>
+          <a:p>
+            <a:r>
+              <a:rPr lang="en-GB" sz="1200" dirty="0"/>
+              <a:t>Louis Felix </a:t>
+            </a:r>
+            <a:r>
+              <a:rPr lang="en-GB" sz="1200" dirty="0" err="1"/>
+              <a:t>Galeota</a:t>
+            </a:r>
+            <a:endParaRPr lang="en-GB" sz="1200" dirty="0"/>
+          </a:p>
+        </p:txBody>
+      </p:sp>
+    </p:spTree>
+    <p:extLst>
+      <p:ext uri="{BB962C8B-B14F-4D97-AF65-F5344CB8AC3E}">
+        <p14:creationId xmlns:p14="http://schemas.microsoft.com/office/powerpoint/2010/main" val="3344689899"/>
+      </p:ext>
+    </p:extLst>
+  </p:cSld>
+  <p:clrMapOvr>
+    <a:masterClrMapping/>
+  </p:clrMapOvr>
+</p:sld>
+</file>
+
 <file path=ppt/slides/slide2.xml><?xml version="1.0" encoding="utf-8"?>
 <p:sld xmlns:a="http://schemas.openxmlformats.org/drawingml/2006/main" xmlns:r="http://schemas.openxmlformats.org/officeDocument/2006/relationships" xmlns:p="http://schemas.openxmlformats.org/presentationml/2006/main">
   <p:cSld>
@@ -6330,7 +7083,7 @@
           <a:p>
             <a:r>
               <a:rPr lang="en-GB" dirty="0"/>
-              <a:t>Frontend</a:t>
+              <a:t>Frontend - 1</a:t>
             </a:r>
           </a:p>
         </p:txBody>
@@ -6413,7 +7166,7 @@
           <a:p>
             <a:r>
               <a:rPr lang="en-GB" dirty="0"/>
-              <a:t>Frontend</a:t>
+              <a:t>Frontend - 2</a:t>
             </a:r>
           </a:p>
         </p:txBody>
@@ -6496,7 +7249,7 @@
           <a:p>
             <a:r>
               <a:rPr lang="en-GB" dirty="0"/>
-              <a:t>Frontend</a:t>
+              <a:t>Frontend - 3</a:t>
             </a:r>
           </a:p>
         </p:txBody>
@@ -6578,10 +7331,9 @@
           <a:lstStyle/>
           <a:p>
             <a:r>
-              <a:rPr lang="en-GB"/>
-              <a:t>Technical Specialities</a:t>
-            </a:r>
-            <a:endParaRPr lang="en-GB" dirty="0"/>
+              <a:rPr lang="en-GB" dirty="0"/>
+              <a:t>Solution Techniques - 1</a:t>
+            </a:r>
           </a:p>
         </p:txBody>
       </p:sp>
@@ -6614,6 +7366,172 @@
     <p:extLst>
       <p:ext uri="{BB962C8B-B14F-4D97-AF65-F5344CB8AC3E}">
         <p14:creationId xmlns:p14="http://schemas.microsoft.com/office/powerpoint/2010/main" val="2144228570"/>
+      </p:ext>
+    </p:extLst>
+  </p:cSld>
+  <p:clrMapOvr>
+    <a:masterClrMapping/>
+  </p:clrMapOvr>
+</p:sld>
+</file>
+
+<file path=ppt/slides/slide8.xml><?xml version="1.0" encoding="utf-8"?>
+<p:sld xmlns:a="http://schemas.openxmlformats.org/drawingml/2006/main" xmlns:r="http://schemas.openxmlformats.org/officeDocument/2006/relationships" xmlns:p="http://schemas.openxmlformats.org/presentationml/2006/main">
+  <p:cSld>
+    <p:spTree>
+      <p:nvGrpSpPr>
+        <p:cNvPr id="1" name=""/>
+        <p:cNvGrpSpPr/>
+        <p:nvPr/>
+      </p:nvGrpSpPr>
+      <p:grpSpPr>
+        <a:xfrm>
+          <a:off x="0" y="0"/>
+          <a:ext cx="0" cy="0"/>
+          <a:chOff x="0" y="0"/>
+          <a:chExt cx="0" cy="0"/>
+        </a:xfrm>
+      </p:grpSpPr>
+      <p:sp>
+        <p:nvSpPr>
+          <p:cNvPr id="2" name="Title 1">
+            <a:extLst>
+              <a:ext uri="{FF2B5EF4-FFF2-40B4-BE49-F238E27FC236}">
+                <a16:creationId xmlns:a16="http://schemas.microsoft.com/office/drawing/2014/main" id="{C4F69968-EC52-4A41-88D8-2FEAC30DAF81}"/>
+              </a:ext>
+            </a:extLst>
+          </p:cNvPr>
+          <p:cNvSpPr>
+            <a:spLocks noGrp="1"/>
+          </p:cNvSpPr>
+          <p:nvPr>
+            <p:ph type="title"/>
+          </p:nvPr>
+        </p:nvSpPr>
+        <p:spPr/>
+        <p:txBody>
+          <a:bodyPr/>
+          <a:lstStyle/>
+          <a:p>
+            <a:r>
+              <a:rPr lang="en-GB" dirty="0"/>
+              <a:t>Solution Techniques - 2</a:t>
+            </a:r>
+          </a:p>
+        </p:txBody>
+      </p:sp>
+      <p:sp>
+        <p:nvSpPr>
+          <p:cNvPr id="3" name="Content Placeholder 2">
+            <a:extLst>
+              <a:ext uri="{FF2B5EF4-FFF2-40B4-BE49-F238E27FC236}">
+                <a16:creationId xmlns:a16="http://schemas.microsoft.com/office/drawing/2014/main" id="{A9C0E44A-50D8-43E1-9809-4C7B991870E4}"/>
+              </a:ext>
+            </a:extLst>
+          </p:cNvPr>
+          <p:cNvSpPr>
+            <a:spLocks noGrp="1"/>
+          </p:cNvSpPr>
+          <p:nvPr>
+            <p:ph idx="1"/>
+          </p:nvPr>
+        </p:nvSpPr>
+        <p:spPr/>
+        <p:txBody>
+          <a:bodyPr/>
+          <a:lstStyle/>
+          <a:p>
+            <a:endParaRPr lang="en-GB" dirty="0"/>
+          </a:p>
+        </p:txBody>
+      </p:sp>
+    </p:spTree>
+    <p:extLst>
+      <p:ext uri="{BB962C8B-B14F-4D97-AF65-F5344CB8AC3E}">
+        <p14:creationId xmlns:p14="http://schemas.microsoft.com/office/powerpoint/2010/main" val="897156958"/>
+      </p:ext>
+    </p:extLst>
+  </p:cSld>
+  <p:clrMapOvr>
+    <a:masterClrMapping/>
+  </p:clrMapOvr>
+</p:sld>
+</file>
+
+<file path=ppt/slides/slide9.xml><?xml version="1.0" encoding="utf-8"?>
+<p:sld xmlns:a="http://schemas.openxmlformats.org/drawingml/2006/main" xmlns:r="http://schemas.openxmlformats.org/officeDocument/2006/relationships" xmlns:p="http://schemas.openxmlformats.org/presentationml/2006/main">
+  <p:cSld>
+    <p:spTree>
+      <p:nvGrpSpPr>
+        <p:cNvPr id="1" name=""/>
+        <p:cNvGrpSpPr/>
+        <p:nvPr/>
+      </p:nvGrpSpPr>
+      <p:grpSpPr>
+        <a:xfrm>
+          <a:off x="0" y="0"/>
+          <a:ext cx="0" cy="0"/>
+          <a:chOff x="0" y="0"/>
+          <a:chExt cx="0" cy="0"/>
+        </a:xfrm>
+      </p:grpSpPr>
+      <p:sp>
+        <p:nvSpPr>
+          <p:cNvPr id="2" name="Title 1">
+            <a:extLst>
+              <a:ext uri="{FF2B5EF4-FFF2-40B4-BE49-F238E27FC236}">
+                <a16:creationId xmlns:a16="http://schemas.microsoft.com/office/drawing/2014/main" id="{C4F69968-EC52-4A41-88D8-2FEAC30DAF81}"/>
+              </a:ext>
+            </a:extLst>
+          </p:cNvPr>
+          <p:cNvSpPr>
+            <a:spLocks noGrp="1"/>
+          </p:cNvSpPr>
+          <p:nvPr>
+            <p:ph type="title"/>
+          </p:nvPr>
+        </p:nvSpPr>
+        <p:spPr/>
+        <p:txBody>
+          <a:bodyPr/>
+          <a:lstStyle/>
+          <a:p>
+            <a:r>
+              <a:rPr lang="en-GB" dirty="0"/>
+              <a:t>Solution Techniques - 3</a:t>
+            </a:r>
+          </a:p>
+        </p:txBody>
+      </p:sp>
+      <p:sp>
+        <p:nvSpPr>
+          <p:cNvPr id="3" name="Content Placeholder 2">
+            <a:extLst>
+              <a:ext uri="{FF2B5EF4-FFF2-40B4-BE49-F238E27FC236}">
+                <a16:creationId xmlns:a16="http://schemas.microsoft.com/office/drawing/2014/main" id="{A9C0E44A-50D8-43E1-9809-4C7B991870E4}"/>
+              </a:ext>
+            </a:extLst>
+          </p:cNvPr>
+          <p:cNvSpPr>
+            <a:spLocks noGrp="1"/>
+          </p:cNvSpPr>
+          <p:nvPr>
+            <p:ph idx="1"/>
+          </p:nvPr>
+        </p:nvSpPr>
+        <p:spPr/>
+        <p:txBody>
+          <a:bodyPr/>
+          <a:lstStyle/>
+          <a:p>
+            <a:endParaRPr lang="en-GB" dirty="0"/>
+          </a:p>
+        </p:txBody>
+      </p:sp>
+    </p:spTree>
+    <p:extLst>
+      <p:ext uri="{BB962C8B-B14F-4D97-AF65-F5344CB8AC3E}">
+        <p14:creationId xmlns:p14="http://schemas.microsoft.com/office/powerpoint/2010/main" val="2484512012"/>
       </p:ext>
     </p:extLst>
   </p:cSld>

</xml_diff>